<commit_message>
Adding start of the flask list
</commit_message>
<xml_diff>
--- a/Building Single page applications.pptx
+++ b/Building Single page applications.pptx
@@ -11,6 +11,7 @@
     <p:sldId id="259" r:id="rId5"/>
     <p:sldId id="260" r:id="rId6"/>
     <p:sldId id="261" r:id="rId7"/>
+    <p:sldId id="262" r:id="rId8"/>
   </p:sldIdLst>
   <p:sldSz cx="9144000" cy="6858000" type="screen4x3"/>
   <p:notesSz cx="6858000" cy="9144000"/>
@@ -15264,15 +15265,33 @@
                                   </p:childTnLst>
                                 </p:cTn>
                               </p:par>
+                            </p:childTnLst>
+                          </p:cTn>
+                        </p:par>
+                      </p:childTnLst>
+                    </p:cTn>
+                  </p:par>
+                  <p:par>
+                    <p:cTn id="9" fill="hold">
+                      <p:stCondLst>
+                        <p:cond delay="indefinite"/>
+                      </p:stCondLst>
+                      <p:childTnLst>
+                        <p:par>
+                          <p:cTn id="10" fill="hold">
+                            <p:stCondLst>
+                              <p:cond delay="0"/>
+                            </p:stCondLst>
+                            <p:childTnLst>
                               <p:par>
-                                <p:cTn id="9" presetID="1" presetClass="entr" presetSubtype="0" fill="hold" grpId="0" nodeType="withEffect">
+                                <p:cTn id="11" presetID="1" presetClass="entr" presetSubtype="0" fill="hold" grpId="0" nodeType="clickEffect">
                                   <p:stCondLst>
                                     <p:cond delay="0"/>
                                   </p:stCondLst>
                                   <p:childTnLst>
                                     <p:set>
                                       <p:cBhvr>
-                                        <p:cTn id="10" dur="1" fill="hold">
+                                        <p:cTn id="12" dur="1" fill="hold">
                                           <p:stCondLst>
                                             <p:cond delay="0"/>
                                           </p:stCondLst>
@@ -15322,6 +15341,110 @@
       <p:bldP spid="4" grpId="0"/>
       <p:bldP spid="5" grpId="0"/>
     </p:bldLst>
+  </p:timing>
+</p:sld>
+</file>
+
+<file path=ppt/slides/slide7.xml><?xml version="1.0" encoding="utf-8"?>
+<p:sld xmlns:a="http://schemas.openxmlformats.org/drawingml/2006/main" xmlns:r="http://schemas.openxmlformats.org/officeDocument/2006/relationships" xmlns:p="http://schemas.openxmlformats.org/presentationml/2006/main">
+  <p:cSld>
+    <p:spTree>
+      <p:nvGrpSpPr>
+        <p:cNvPr id="1" name=""/>
+        <p:cNvGrpSpPr/>
+        <p:nvPr/>
+      </p:nvGrpSpPr>
+      <p:grpSpPr>
+        <a:xfrm>
+          <a:off x="0" y="0"/>
+          <a:ext cx="0" cy="0"/>
+          <a:chOff x="0" y="0"/>
+          <a:chExt cx="0" cy="0"/>
+        </a:xfrm>
+      </p:grpSpPr>
+      <p:sp>
+        <p:nvSpPr>
+          <p:cNvPr id="2" name="Title 1"/>
+          <p:cNvSpPr>
+            <a:spLocks noGrp="1"/>
+          </p:cNvSpPr>
+          <p:nvPr>
+            <p:ph type="title"/>
+          </p:nvPr>
+        </p:nvSpPr>
+        <p:spPr/>
+        <p:txBody>
+          <a:bodyPr>
+            <a:normAutofit fontScale="90000"/>
+          </a:bodyPr>
+          <a:lstStyle/>
+          <a:p>
+            <a:pPr algn="ctr"/>
+            <a:r>
+              <a:rPr lang="en-US" dirty="0" smtClean="0"/>
+              <a:t>Shifting functionality to the browser</a:t>
+            </a:r>
+            <a:endParaRPr lang="en-US" dirty="0"/>
+          </a:p>
+        </p:txBody>
+      </p:sp>
+      <p:sp>
+        <p:nvSpPr>
+          <p:cNvPr id="3" name="Content Placeholder 2"/>
+          <p:cNvSpPr>
+            <a:spLocks noGrp="1"/>
+          </p:cNvSpPr>
+          <p:nvPr>
+            <p:ph idx="1"/>
+          </p:nvPr>
+        </p:nvSpPr>
+        <p:spPr/>
+        <p:txBody>
+          <a:bodyPr/>
+          <a:lstStyle/>
+          <a:p>
+            <a:r>
+              <a:rPr lang="en-US" dirty="0" smtClean="0"/>
+              <a:t>AJAX</a:t>
+            </a:r>
+          </a:p>
+          <a:p>
+            <a:r>
+              <a:rPr lang="en-US" dirty="0" smtClean="0"/>
+              <a:t>Fast JavaScript</a:t>
+            </a:r>
+          </a:p>
+          <a:p>
+            <a:r>
+              <a:rPr lang="en-US" dirty="0" smtClean="0"/>
+              <a:t>Great JavaScript libraries</a:t>
+            </a:r>
+          </a:p>
+          <a:p>
+            <a:r>
+              <a:rPr lang="en-US" dirty="0" smtClean="0"/>
+              <a:t>Browser Data Storage</a:t>
+            </a:r>
+            <a:endParaRPr lang="en-US" dirty="0"/>
+          </a:p>
+        </p:txBody>
+      </p:sp>
+    </p:spTree>
+    <p:extLst>
+      <p:ext uri="{BB962C8B-B14F-4D97-AF65-F5344CB8AC3E}">
+        <p14:creationId xmlns:p14="http://schemas.microsoft.com/office/powerpoint/2010/main" val="3320734026"/>
+      </p:ext>
+    </p:extLst>
+  </p:cSld>
+  <p:clrMapOvr>
+    <a:masterClrMapping/>
+  </p:clrMapOvr>
+  <p:timing>
+    <p:tnLst>
+      <p:par>
+        <p:cTn id="1" dur="indefinite" restart="never" nodeType="tmRoot"/>
+      </p:par>
+    </p:tnLst>
   </p:timing>
 </p:sld>
 </file>

</xml_diff>

<commit_message>
Adding some knockout action to flask
</commit_message>
<xml_diff>
--- a/Building Single page applications.pptx
+++ b/Building Single page applications.pptx
@@ -12,6 +12,7 @@
     <p:sldId id="260" r:id="rId6"/>
     <p:sldId id="261" r:id="rId7"/>
     <p:sldId id="262" r:id="rId8"/>
+    <p:sldId id="263" r:id="rId9"/>
   </p:sldIdLst>
   <p:sldSz cx="9144000" cy="6858000" type="screen4x3"/>
   <p:notesSz cx="6858000" cy="9144000"/>
@@ -1651,7 +1652,7 @@
           <a:p>
             <a:fld id="{42FBCB45-7D55-4A68-9291-A81D38998EF3}" type="datetimeFigureOut">
               <a:rPr lang="en-US" smtClean="0"/>
-              <a:t>9/2/2012</a:t>
+              <a:t>9/27/2012</a:t>
             </a:fld>
             <a:endParaRPr lang="en-US"/>
           </a:p>
@@ -2756,7 +2757,7 @@
           <a:p>
             <a:fld id="{42FBCB45-7D55-4A68-9291-A81D38998EF3}" type="datetimeFigureOut">
               <a:rPr lang="en-US" smtClean="0"/>
-              <a:t>9/2/2012</a:t>
+              <a:t>9/27/2012</a:t>
             </a:fld>
             <a:endParaRPr lang="en-US"/>
           </a:p>
@@ -3869,7 +3870,7 @@
           <a:p>
             <a:fld id="{42FBCB45-7D55-4A68-9291-A81D38998EF3}" type="datetimeFigureOut">
               <a:rPr lang="en-US" smtClean="0"/>
-              <a:t>9/2/2012</a:t>
+              <a:t>9/27/2012</a:t>
             </a:fld>
             <a:endParaRPr lang="en-US"/>
           </a:p>
@@ -4977,7 +4978,7 @@
           <a:p>
             <a:fld id="{42FBCB45-7D55-4A68-9291-A81D38998EF3}" type="datetimeFigureOut">
               <a:rPr lang="en-US" smtClean="0"/>
-              <a:t>9/2/2012</a:t>
+              <a:t>9/27/2012</a:t>
             </a:fld>
             <a:endParaRPr lang="en-US"/>
           </a:p>
@@ -6570,7 +6571,7 @@
           <a:p>
             <a:fld id="{42FBCB45-7D55-4A68-9291-A81D38998EF3}" type="datetimeFigureOut">
               <a:rPr lang="en-US" smtClean="0"/>
-              <a:t>9/2/2012</a:t>
+              <a:t>9/27/2012</a:t>
             </a:fld>
             <a:endParaRPr lang="en-US"/>
           </a:p>
@@ -7628,7 +7629,7 @@
           <a:p>
             <a:fld id="{42FBCB45-7D55-4A68-9291-A81D38998EF3}" type="datetimeFigureOut">
               <a:rPr lang="en-US" smtClean="0"/>
-              <a:t>9/2/2012</a:t>
+              <a:t>9/27/2012</a:t>
             </a:fld>
             <a:endParaRPr lang="en-US"/>
           </a:p>
@@ -8955,7 +8956,7 @@
           <a:p>
             <a:fld id="{42FBCB45-7D55-4A68-9291-A81D38998EF3}" type="datetimeFigureOut">
               <a:rPr lang="en-US" smtClean="0"/>
-              <a:t>9/2/2012</a:t>
+              <a:t>9/27/2012</a:t>
             </a:fld>
             <a:endParaRPr lang="en-US"/>
           </a:p>
@@ -10092,7 +10093,7 @@
           <a:p>
             <a:fld id="{42FBCB45-7D55-4A68-9291-A81D38998EF3}" type="datetimeFigureOut">
               <a:rPr lang="en-US" smtClean="0"/>
-              <a:t>9/2/2012</a:t>
+              <a:t>9/27/2012</a:t>
             </a:fld>
             <a:endParaRPr lang="en-US"/>
           </a:p>
@@ -11148,7 +11149,7 @@
           <a:p>
             <a:fld id="{42FBCB45-7D55-4A68-9291-A81D38998EF3}" type="datetimeFigureOut">
               <a:rPr lang="en-US" smtClean="0"/>
-              <a:t>9/2/2012</a:t>
+              <a:t>9/27/2012</a:t>
             </a:fld>
             <a:endParaRPr lang="en-US"/>
           </a:p>
@@ -12186,7 +12187,7 @@
           <a:p>
             <a:fld id="{42FBCB45-7D55-4A68-9291-A81D38998EF3}" type="datetimeFigureOut">
               <a:rPr lang="en-US" smtClean="0"/>
-              <a:t>9/2/2012</a:t>
+              <a:t>9/27/2012</a:t>
             </a:fld>
             <a:endParaRPr lang="en-US"/>
           </a:p>
@@ -13421,7 +13422,7 @@
           <a:p>
             <a:fld id="{42FBCB45-7D55-4A68-9291-A81D38998EF3}" type="datetimeFigureOut">
               <a:rPr lang="en-US" smtClean="0"/>
-              <a:t>9/2/2012</a:t>
+              <a:t>9/27/2012</a:t>
             </a:fld>
             <a:endParaRPr lang="en-US"/>
           </a:p>
@@ -13774,7 +13775,7 @@
           <a:p>
             <a:fld id="{42FBCB45-7D55-4A68-9291-A81D38998EF3}" type="datetimeFigureOut">
               <a:rPr lang="en-US" smtClean="0"/>
-              <a:t>9/2/2012</a:t>
+              <a:t>9/27/2012</a:t>
             </a:fld>
             <a:endParaRPr lang="en-US"/>
           </a:p>
@@ -15449,6 +15450,136 @@
 </p:sld>
 </file>
 
+<file path=ppt/slides/slide8.xml><?xml version="1.0" encoding="utf-8"?>
+<p:sld xmlns:a="http://schemas.openxmlformats.org/drawingml/2006/main" xmlns:r="http://schemas.openxmlformats.org/officeDocument/2006/relationships" xmlns:p="http://schemas.openxmlformats.org/presentationml/2006/main">
+  <p:cSld>
+    <p:spTree>
+      <p:nvGrpSpPr>
+        <p:cNvPr id="1" name=""/>
+        <p:cNvGrpSpPr/>
+        <p:nvPr/>
+      </p:nvGrpSpPr>
+      <p:grpSpPr>
+        <a:xfrm>
+          <a:off x="0" y="0"/>
+          <a:ext cx="0" cy="0"/>
+          <a:chOff x="0" y="0"/>
+          <a:chExt cx="0" cy="0"/>
+        </a:xfrm>
+      </p:grpSpPr>
+      <p:sp>
+        <p:nvSpPr>
+          <p:cNvPr id="2" name="Title 1"/>
+          <p:cNvSpPr>
+            <a:spLocks noGrp="1"/>
+          </p:cNvSpPr>
+          <p:nvPr>
+            <p:ph type="title"/>
+          </p:nvPr>
+        </p:nvSpPr>
+        <p:spPr/>
+        <p:txBody>
+          <a:bodyPr>
+            <a:normAutofit fontScale="90000"/>
+          </a:bodyPr>
+          <a:lstStyle/>
+          <a:p>
+            <a:r>
+              <a:rPr lang="en-US" dirty="0" smtClean="0"/>
+              <a:t>How can asp.net </a:t>
+            </a:r>
+            <a:r>
+              <a:rPr lang="en-US" dirty="0" err="1" smtClean="0"/>
+              <a:t>mvc</a:t>
+            </a:r>
+            <a:r>
+              <a:rPr lang="en-US" dirty="0" smtClean="0"/>
+              <a:t> help with </a:t>
+            </a:r>
+            <a:r>
+              <a:rPr lang="en-US" dirty="0" err="1" smtClean="0"/>
+              <a:t>ajax</a:t>
+            </a:r>
+            <a:r>
+              <a:rPr lang="en-US" dirty="0" smtClean="0"/>
+              <a:t>?</a:t>
+            </a:r>
+            <a:endParaRPr lang="en-US" dirty="0"/>
+          </a:p>
+        </p:txBody>
+      </p:sp>
+      <p:sp>
+        <p:nvSpPr>
+          <p:cNvPr id="3" name="Content Placeholder 2"/>
+          <p:cNvSpPr>
+            <a:spLocks noGrp="1"/>
+          </p:cNvSpPr>
+          <p:nvPr>
+            <p:ph idx="1"/>
+          </p:nvPr>
+        </p:nvSpPr>
+        <p:spPr/>
+        <p:txBody>
+          <a:bodyPr/>
+          <a:lstStyle/>
+          <a:p>
+            <a:r>
+              <a:rPr lang="en-US" dirty="0" smtClean="0"/>
+              <a:t>Controllers can take and return JSON</a:t>
+            </a:r>
+          </a:p>
+          <a:p>
+            <a:r>
+              <a:rPr lang="en-US" dirty="0" err="1" smtClean="0"/>
+              <a:t>WebAPI</a:t>
+            </a:r>
+            <a:r>
+              <a:rPr lang="en-US" dirty="0" smtClean="0"/>
+              <a:t> allows for </a:t>
+            </a:r>
+            <a:r>
+              <a:rPr lang="en-US" dirty="0" err="1" smtClean="0"/>
+              <a:t>RESTful</a:t>
+            </a:r>
+            <a:r>
+              <a:rPr lang="en-US" dirty="0" smtClean="0"/>
+              <a:t> </a:t>
+            </a:r>
+            <a:r>
+              <a:rPr lang="en-US" dirty="0" smtClean="0"/>
+              <a:t>services</a:t>
+            </a:r>
+          </a:p>
+          <a:p>
+            <a:r>
+              <a:rPr lang="en-US" dirty="0" smtClean="0"/>
+              <a:t>JavaScript </a:t>
+            </a:r>
+            <a:r>
+              <a:rPr lang="en-US" dirty="0" err="1" smtClean="0"/>
+              <a:t>minification</a:t>
+            </a:r>
+            <a:r>
+              <a:rPr lang="en-US" dirty="0" smtClean="0"/>
+              <a:t> and concatenation </a:t>
+            </a:r>
+            <a:endParaRPr lang="en-US" dirty="0"/>
+          </a:p>
+        </p:txBody>
+      </p:sp>
+    </p:spTree>
+    <p:extLst>
+      <p:ext uri="{BB962C8B-B14F-4D97-AF65-F5344CB8AC3E}">
+        <p14:creationId xmlns:p14="http://schemas.microsoft.com/office/powerpoint/2010/main" val="3198176923"/>
+      </p:ext>
+    </p:extLst>
+  </p:cSld>
+  <p:clrMapOvr>
+    <a:masterClrMapping/>
+  </p:clrMapOvr>
+</p:sld>
+</file>
+
 <file path=ppt/theme/theme1.xml><?xml version="1.0" encoding="utf-8"?>
 <a:theme xmlns:a="http://schemas.openxmlformats.org/drawingml/2006/main" name="Urban Pop">
   <a:themeElements>

</xml_diff>

<commit_message>
Adding some fleshing out to the knockout demo
</commit_message>
<xml_diff>
--- a/Building Single page applications.pptx
+++ b/Building Single page applications.pptx
@@ -18,12 +18,17 @@
     <p:sldId id="270" r:id="rId12"/>
     <p:sldId id="263" r:id="rId13"/>
     <p:sldId id="264" r:id="rId14"/>
-    <p:sldId id="265" r:id="rId15"/>
-    <p:sldId id="269" r:id="rId16"/>
-    <p:sldId id="271" r:id="rId17"/>
-    <p:sldId id="272" r:id="rId18"/>
-    <p:sldId id="273" r:id="rId19"/>
-    <p:sldId id="274" r:id="rId20"/>
+    <p:sldId id="275" r:id="rId15"/>
+    <p:sldId id="276" r:id="rId16"/>
+    <p:sldId id="277" r:id="rId17"/>
+    <p:sldId id="279" r:id="rId18"/>
+    <p:sldId id="265" r:id="rId19"/>
+    <p:sldId id="269" r:id="rId20"/>
+    <p:sldId id="271" r:id="rId21"/>
+    <p:sldId id="272" r:id="rId22"/>
+    <p:sldId id="273" r:id="rId23"/>
+    <p:sldId id="278" r:id="rId24"/>
+    <p:sldId id="274" r:id="rId25"/>
   </p:sldIdLst>
   <p:sldSz cx="9144000" cy="6858000" type="screen4x3"/>
   <p:notesSz cx="6858000" cy="9144000"/>
@@ -1663,7 +1668,7 @@
           <a:p>
             <a:fld id="{42FBCB45-7D55-4A68-9291-A81D38998EF3}" type="datetimeFigureOut">
               <a:rPr lang="en-US" smtClean="0"/>
-              <a:t>9/29/2012</a:t>
+              <a:t>9/30/2012</a:t>
             </a:fld>
             <a:endParaRPr lang="en-US"/>
           </a:p>
@@ -2768,7 +2773,7 @@
           <a:p>
             <a:fld id="{42FBCB45-7D55-4A68-9291-A81D38998EF3}" type="datetimeFigureOut">
               <a:rPr lang="en-US" smtClean="0"/>
-              <a:t>9/29/2012</a:t>
+              <a:t>9/30/2012</a:t>
             </a:fld>
             <a:endParaRPr lang="en-US"/>
           </a:p>
@@ -3881,7 +3886,7 @@
           <a:p>
             <a:fld id="{42FBCB45-7D55-4A68-9291-A81D38998EF3}" type="datetimeFigureOut">
               <a:rPr lang="en-US" smtClean="0"/>
-              <a:t>9/29/2012</a:t>
+              <a:t>9/30/2012</a:t>
             </a:fld>
             <a:endParaRPr lang="en-US"/>
           </a:p>
@@ -4989,7 +4994,7 @@
           <a:p>
             <a:fld id="{42FBCB45-7D55-4A68-9291-A81D38998EF3}" type="datetimeFigureOut">
               <a:rPr lang="en-US" smtClean="0"/>
-              <a:t>9/29/2012</a:t>
+              <a:t>9/30/2012</a:t>
             </a:fld>
             <a:endParaRPr lang="en-US"/>
           </a:p>
@@ -6582,7 +6587,7 @@
           <a:p>
             <a:fld id="{42FBCB45-7D55-4A68-9291-A81D38998EF3}" type="datetimeFigureOut">
               <a:rPr lang="en-US" smtClean="0"/>
-              <a:t>9/29/2012</a:t>
+              <a:t>9/30/2012</a:t>
             </a:fld>
             <a:endParaRPr lang="en-US"/>
           </a:p>
@@ -7640,7 +7645,7 @@
           <a:p>
             <a:fld id="{42FBCB45-7D55-4A68-9291-A81D38998EF3}" type="datetimeFigureOut">
               <a:rPr lang="en-US" smtClean="0"/>
-              <a:t>9/29/2012</a:t>
+              <a:t>9/30/2012</a:t>
             </a:fld>
             <a:endParaRPr lang="en-US"/>
           </a:p>
@@ -8967,7 +8972,7 @@
           <a:p>
             <a:fld id="{42FBCB45-7D55-4A68-9291-A81D38998EF3}" type="datetimeFigureOut">
               <a:rPr lang="en-US" smtClean="0"/>
-              <a:t>9/29/2012</a:t>
+              <a:t>9/30/2012</a:t>
             </a:fld>
             <a:endParaRPr lang="en-US"/>
           </a:p>
@@ -10104,7 +10109,7 @@
           <a:p>
             <a:fld id="{42FBCB45-7D55-4A68-9291-A81D38998EF3}" type="datetimeFigureOut">
               <a:rPr lang="en-US" smtClean="0"/>
-              <a:t>9/29/2012</a:t>
+              <a:t>9/30/2012</a:t>
             </a:fld>
             <a:endParaRPr lang="en-US"/>
           </a:p>
@@ -11160,7 +11165,7 @@
           <a:p>
             <a:fld id="{42FBCB45-7D55-4A68-9291-A81D38998EF3}" type="datetimeFigureOut">
               <a:rPr lang="en-US" smtClean="0"/>
-              <a:t>9/29/2012</a:t>
+              <a:t>9/30/2012</a:t>
             </a:fld>
             <a:endParaRPr lang="en-US"/>
           </a:p>
@@ -12198,7 +12203,7 @@
           <a:p>
             <a:fld id="{42FBCB45-7D55-4A68-9291-A81D38998EF3}" type="datetimeFigureOut">
               <a:rPr lang="en-US" smtClean="0"/>
-              <a:t>9/29/2012</a:t>
+              <a:t>9/30/2012</a:t>
             </a:fld>
             <a:endParaRPr lang="en-US"/>
           </a:p>
@@ -13433,7 +13438,7 @@
           <a:p>
             <a:fld id="{42FBCB45-7D55-4A68-9291-A81D38998EF3}" type="datetimeFigureOut">
               <a:rPr lang="en-US" smtClean="0"/>
-              <a:t>9/29/2012</a:t>
+              <a:t>9/30/2012</a:t>
             </a:fld>
             <a:endParaRPr lang="en-US"/>
           </a:p>
@@ -13786,7 +13791,7 @@
           <a:p>
             <a:fld id="{42FBCB45-7D55-4A68-9291-A81D38998EF3}" type="datetimeFigureOut">
               <a:rPr lang="en-US" smtClean="0"/>
-              <a:t>9/29/2012</a:t>
+              <a:t>9/30/2012</a:t>
             </a:fld>
             <a:endParaRPr lang="en-US"/>
           </a:p>
@@ -15035,6 +15040,408 @@
           <a:p>
             <a:r>
               <a:rPr lang="en-US" dirty="0" smtClean="0"/>
+              <a:t>WEB API</a:t>
+            </a:r>
+            <a:endParaRPr lang="en-US" dirty="0"/>
+          </a:p>
+        </p:txBody>
+      </p:sp>
+      <p:sp>
+        <p:nvSpPr>
+          <p:cNvPr id="3" name="Content Placeholder 2"/>
+          <p:cNvSpPr>
+            <a:spLocks noGrp="1"/>
+          </p:cNvSpPr>
+          <p:nvPr>
+            <p:ph idx="1"/>
+          </p:nvPr>
+        </p:nvSpPr>
+        <p:spPr/>
+        <p:txBody>
+          <a:bodyPr/>
+          <a:lstStyle/>
+          <a:p>
+            <a:r>
+              <a:rPr lang="en-US" dirty="0" smtClean="0"/>
+              <a:t>Demo</a:t>
+            </a:r>
+            <a:endParaRPr lang="en-US" dirty="0"/>
+          </a:p>
+        </p:txBody>
+      </p:sp>
+    </p:spTree>
+    <p:extLst>
+      <p:ext uri="{BB962C8B-B14F-4D97-AF65-F5344CB8AC3E}">
+        <p14:creationId xmlns:p14="http://schemas.microsoft.com/office/powerpoint/2010/main" val="1244101276"/>
+      </p:ext>
+    </p:extLst>
+  </p:cSld>
+  <p:clrMapOvr>
+    <a:masterClrMapping/>
+  </p:clrMapOvr>
+  <p:timing>
+    <p:tnLst>
+      <p:par>
+        <p:cTn id="1" dur="indefinite" restart="never" nodeType="tmRoot"/>
+      </p:par>
+    </p:tnLst>
+  </p:timing>
+</p:sld>
+</file>
+
+<file path=ppt/slides/slide15.xml><?xml version="1.0" encoding="utf-8"?>
+<p:sld xmlns:a="http://schemas.openxmlformats.org/drawingml/2006/main" xmlns:r="http://schemas.openxmlformats.org/officeDocument/2006/relationships" xmlns:p="http://schemas.openxmlformats.org/presentationml/2006/main">
+  <p:cSld>
+    <p:spTree>
+      <p:nvGrpSpPr>
+        <p:cNvPr id="1" name=""/>
+        <p:cNvGrpSpPr/>
+        <p:nvPr/>
+      </p:nvGrpSpPr>
+      <p:grpSpPr>
+        <a:xfrm>
+          <a:off x="0" y="0"/>
+          <a:ext cx="0" cy="0"/>
+          <a:chOff x="0" y="0"/>
+          <a:chExt cx="0" cy="0"/>
+        </a:xfrm>
+      </p:grpSpPr>
+      <p:sp>
+        <p:nvSpPr>
+          <p:cNvPr id="2" name="Title 1"/>
+          <p:cNvSpPr>
+            <a:spLocks noGrp="1"/>
+          </p:cNvSpPr>
+          <p:nvPr>
+            <p:ph type="title"/>
+          </p:nvPr>
+        </p:nvSpPr>
+        <p:spPr/>
+        <p:txBody>
+          <a:bodyPr>
+            <a:normAutofit fontScale="90000"/>
+          </a:bodyPr>
+          <a:lstStyle/>
+          <a:p>
+            <a:r>
+              <a:rPr lang="en-US" dirty="0" err="1" smtClean="0"/>
+              <a:t>Javascript</a:t>
+            </a:r>
+            <a:r>
+              <a:rPr lang="en-US" dirty="0" smtClean="0"/>
+              <a:t> </a:t>
+            </a:r>
+            <a:r>
+              <a:rPr lang="en-US" dirty="0" err="1" smtClean="0"/>
+              <a:t>minification</a:t>
+            </a:r>
+            <a:r>
+              <a:rPr lang="en-US" dirty="0" smtClean="0"/>
+              <a:t> and bundling</a:t>
+            </a:r>
+            <a:endParaRPr lang="en-US" dirty="0"/>
+          </a:p>
+        </p:txBody>
+      </p:sp>
+      <p:sp>
+        <p:nvSpPr>
+          <p:cNvPr id="3" name="Content Placeholder 2"/>
+          <p:cNvSpPr>
+            <a:spLocks noGrp="1"/>
+          </p:cNvSpPr>
+          <p:nvPr>
+            <p:ph idx="1"/>
+          </p:nvPr>
+        </p:nvSpPr>
+        <p:spPr/>
+        <p:txBody>
+          <a:bodyPr/>
+          <a:lstStyle/>
+          <a:p>
+            <a:r>
+              <a:rPr lang="en-US" dirty="0" smtClean="0"/>
+              <a:t>Demo</a:t>
+            </a:r>
+            <a:endParaRPr lang="en-US" dirty="0"/>
+          </a:p>
+        </p:txBody>
+      </p:sp>
+    </p:spTree>
+    <p:extLst>
+      <p:ext uri="{BB962C8B-B14F-4D97-AF65-F5344CB8AC3E}">
+        <p14:creationId xmlns:p14="http://schemas.microsoft.com/office/powerpoint/2010/main" val="1359708165"/>
+      </p:ext>
+    </p:extLst>
+  </p:cSld>
+  <p:clrMapOvr>
+    <a:masterClrMapping/>
+  </p:clrMapOvr>
+  <p:timing>
+    <p:tnLst>
+      <p:par>
+        <p:cTn id="1" dur="indefinite" restart="never" nodeType="tmRoot"/>
+      </p:par>
+    </p:tnLst>
+  </p:timing>
+</p:sld>
+</file>
+
+<file path=ppt/slides/slide16.xml><?xml version="1.0" encoding="utf-8"?>
+<p:sld xmlns:a="http://schemas.openxmlformats.org/drawingml/2006/main" xmlns:r="http://schemas.openxmlformats.org/officeDocument/2006/relationships" xmlns:p="http://schemas.openxmlformats.org/presentationml/2006/main">
+  <p:cSld>
+    <p:spTree>
+      <p:nvGrpSpPr>
+        <p:cNvPr id="1" name=""/>
+        <p:cNvGrpSpPr/>
+        <p:nvPr/>
+      </p:nvGrpSpPr>
+      <p:grpSpPr>
+        <a:xfrm>
+          <a:off x="0" y="0"/>
+          <a:ext cx="0" cy="0"/>
+          <a:chOff x="0" y="0"/>
+          <a:chExt cx="0" cy="0"/>
+        </a:xfrm>
+      </p:grpSpPr>
+      <p:sp>
+        <p:nvSpPr>
+          <p:cNvPr id="2" name="Title 1"/>
+          <p:cNvSpPr>
+            <a:spLocks noGrp="1"/>
+          </p:cNvSpPr>
+          <p:nvPr>
+            <p:ph type="title"/>
+          </p:nvPr>
+        </p:nvSpPr>
+        <p:spPr/>
+        <p:txBody>
+          <a:bodyPr/>
+          <a:lstStyle/>
+          <a:p>
+            <a:endParaRPr lang="en-US"/>
+          </a:p>
+        </p:txBody>
+      </p:sp>
+      <p:sp>
+        <p:nvSpPr>
+          <p:cNvPr id="3" name="Content Placeholder 2"/>
+          <p:cNvSpPr>
+            <a:spLocks noGrp="1"/>
+          </p:cNvSpPr>
+          <p:nvPr>
+            <p:ph idx="1"/>
+          </p:nvPr>
+        </p:nvSpPr>
+        <p:spPr/>
+        <p:txBody>
+          <a:bodyPr/>
+          <a:lstStyle/>
+          <a:p>
+            <a:endParaRPr lang="en-US"/>
+          </a:p>
+        </p:txBody>
+      </p:sp>
+      <p:pic>
+        <p:nvPicPr>
+          <p:cNvPr id="4" name="Picture 2"/>
+          <p:cNvPicPr>
+            <a:picLocks noChangeAspect="1" noChangeArrowheads="1"/>
+          </p:cNvPicPr>
+          <p:nvPr/>
+        </p:nvPicPr>
+        <p:blipFill>
+          <a:blip r:embed="rId2">
+            <a:extLst>
+              <a:ext uri="{28A0092B-C50C-407E-A947-70E740481C1C}">
+                <a14:useLocalDpi xmlns:a14="http://schemas.microsoft.com/office/drawing/2010/main" val="0"/>
+              </a:ext>
+            </a:extLst>
+          </a:blip>
+          <a:srcRect/>
+          <a:stretch>
+            <a:fillRect/>
+          </a:stretch>
+        </p:blipFill>
+        <p:spPr bwMode="auto">
+          <a:xfrm>
+            <a:off x="-7121" y="0"/>
+            <a:ext cx="11386868" cy="6858000"/>
+          </a:xfrm>
+          <a:prstGeom prst="rect">
+            <a:avLst/>
+          </a:prstGeom>
+          <a:noFill/>
+          <a:ln>
+            <a:noFill/>
+          </a:ln>
+          <a:effectLst/>
+          <a:extLst>
+            <a:ext uri="{909E8E84-426E-40DD-AFC4-6F175D3DCCD1}">
+              <a14:hiddenFill xmlns:a14="http://schemas.microsoft.com/office/drawing/2010/main">
+                <a:solidFill>
+                  <a:schemeClr val="accent1"/>
+                </a:solidFill>
+              </a14:hiddenFill>
+            </a:ext>
+            <a:ext uri="{91240B29-F687-4F45-9708-019B960494DF}">
+              <a14:hiddenLine xmlns:a14="http://schemas.microsoft.com/office/drawing/2010/main" w="9525">
+                <a:solidFill>
+                  <a:schemeClr val="tx1"/>
+                </a:solidFill>
+                <a:miter lim="800000"/>
+                <a:headEnd/>
+                <a:tailEnd/>
+              </a14:hiddenLine>
+            </a:ext>
+            <a:ext uri="{AF507438-7753-43E0-B8FC-AC1667EBCBE1}">
+              <a14:hiddenEffects xmlns:a14="http://schemas.microsoft.com/office/drawing/2010/main">
+                <a:effectLst>
+                  <a:outerShdw dist="35921" dir="2700000" algn="ctr" rotWithShape="0">
+                    <a:schemeClr val="bg2"/>
+                  </a:outerShdw>
+                </a:effectLst>
+              </a14:hiddenEffects>
+            </a:ext>
+          </a:extLst>
+        </p:spPr>
+      </p:pic>
+    </p:spTree>
+    <p:extLst>
+      <p:ext uri="{BB962C8B-B14F-4D97-AF65-F5344CB8AC3E}">
+        <p14:creationId xmlns:p14="http://schemas.microsoft.com/office/powerpoint/2010/main" val="3907712191"/>
+      </p:ext>
+    </p:extLst>
+  </p:cSld>
+  <p:clrMapOvr>
+    <a:masterClrMapping/>
+  </p:clrMapOvr>
+  <p:timing>
+    <p:tnLst>
+      <p:par>
+        <p:cTn id="1" dur="indefinite" restart="never" nodeType="tmRoot"/>
+      </p:par>
+    </p:tnLst>
+  </p:timing>
+</p:sld>
+</file>
+
+<file path=ppt/slides/slide17.xml><?xml version="1.0" encoding="utf-8"?>
+<p:sld xmlns:a="http://schemas.openxmlformats.org/drawingml/2006/main" xmlns:r="http://schemas.openxmlformats.org/officeDocument/2006/relationships" xmlns:p="http://schemas.openxmlformats.org/presentationml/2006/main">
+  <p:cSld>
+    <p:spTree>
+      <p:nvGrpSpPr>
+        <p:cNvPr id="1" name=""/>
+        <p:cNvGrpSpPr/>
+        <p:nvPr/>
+      </p:nvGrpSpPr>
+      <p:grpSpPr>
+        <a:xfrm>
+          <a:off x="0" y="0"/>
+          <a:ext cx="0" cy="0"/>
+          <a:chOff x="0" y="0"/>
+          <a:chExt cx="0" cy="0"/>
+        </a:xfrm>
+      </p:grpSpPr>
+      <p:sp>
+        <p:nvSpPr>
+          <p:cNvPr id="2" name="Title 1"/>
+          <p:cNvSpPr>
+            <a:spLocks noGrp="1"/>
+          </p:cNvSpPr>
+          <p:nvPr>
+            <p:ph type="title"/>
+          </p:nvPr>
+        </p:nvSpPr>
+        <p:spPr/>
+        <p:txBody>
+          <a:bodyPr/>
+          <a:lstStyle/>
+          <a:p>
+            <a:r>
+              <a:rPr lang="en-US" dirty="0" smtClean="0"/>
+              <a:t>Knockout.js</a:t>
+            </a:r>
+            <a:endParaRPr lang="en-US" dirty="0"/>
+          </a:p>
+        </p:txBody>
+      </p:sp>
+      <p:sp>
+        <p:nvSpPr>
+          <p:cNvPr id="3" name="Content Placeholder 2"/>
+          <p:cNvSpPr>
+            <a:spLocks noGrp="1"/>
+          </p:cNvSpPr>
+          <p:nvPr>
+            <p:ph idx="1"/>
+          </p:nvPr>
+        </p:nvSpPr>
+        <p:spPr/>
+        <p:txBody>
+          <a:bodyPr/>
+          <a:lstStyle/>
+          <a:p>
+            <a:r>
+              <a:rPr lang="en-US" dirty="0" smtClean="0"/>
+              <a:t>Demo</a:t>
+            </a:r>
+            <a:endParaRPr lang="en-US" dirty="0"/>
+          </a:p>
+        </p:txBody>
+      </p:sp>
+    </p:spTree>
+    <p:extLst>
+      <p:ext uri="{BB962C8B-B14F-4D97-AF65-F5344CB8AC3E}">
+        <p14:creationId xmlns:p14="http://schemas.microsoft.com/office/powerpoint/2010/main" val="788917942"/>
+      </p:ext>
+    </p:extLst>
+  </p:cSld>
+  <p:clrMapOvr>
+    <a:masterClrMapping/>
+  </p:clrMapOvr>
+  <p:timing>
+    <p:tnLst>
+      <p:par>
+        <p:cTn id="1" dur="indefinite" restart="never" nodeType="tmRoot"/>
+      </p:par>
+    </p:tnLst>
+  </p:timing>
+</p:sld>
+</file>
+
+<file path=ppt/slides/slide18.xml><?xml version="1.0" encoding="utf-8"?>
+<p:sld xmlns:a="http://schemas.openxmlformats.org/drawingml/2006/main" xmlns:r="http://schemas.openxmlformats.org/officeDocument/2006/relationships" xmlns:p="http://schemas.openxmlformats.org/presentationml/2006/main">
+  <p:cSld>
+    <p:spTree>
+      <p:nvGrpSpPr>
+        <p:cNvPr id="1" name=""/>
+        <p:cNvGrpSpPr/>
+        <p:nvPr/>
+      </p:nvGrpSpPr>
+      <p:grpSpPr>
+        <a:xfrm>
+          <a:off x="0" y="0"/>
+          <a:ext cx="0" cy="0"/>
+          <a:chOff x="0" y="0"/>
+          <a:chExt cx="0" cy="0"/>
+        </a:xfrm>
+      </p:grpSpPr>
+      <p:sp>
+        <p:nvSpPr>
+          <p:cNvPr id="2" name="Title 1"/>
+          <p:cNvSpPr>
+            <a:spLocks noGrp="1"/>
+          </p:cNvSpPr>
+          <p:nvPr>
+            <p:ph type="title"/>
+          </p:nvPr>
+        </p:nvSpPr>
+        <p:spPr/>
+        <p:txBody>
+          <a:bodyPr/>
+          <a:lstStyle/>
+          <a:p>
+            <a:r>
+              <a:rPr lang="en-US" dirty="0" smtClean="0"/>
               <a:t>Some examples</a:t>
             </a:r>
             <a:endParaRPr lang="en-US" dirty="0"/>
@@ -15116,7 +15523,7 @@
 </p:sld>
 </file>
 
-<file path=ppt/slides/slide15.xml><?xml version="1.0" encoding="utf-8"?>
+<file path=ppt/slides/slide19.xml><?xml version="1.0" encoding="utf-8"?>
 <p:sld xmlns:a="http://schemas.openxmlformats.org/drawingml/2006/main" xmlns:r="http://schemas.openxmlformats.org/officeDocument/2006/relationships" xmlns:p="http://schemas.openxmlformats.org/presentationml/2006/main">
   <p:cSld>
     <p:spTree>
@@ -15817,512 +16224,6 @@
 </p:sld>
 </file>
 
-<file path=ppt/slides/slide16.xml><?xml version="1.0" encoding="utf-8"?>
-<p:sld xmlns:a="http://schemas.openxmlformats.org/drawingml/2006/main" xmlns:r="http://schemas.openxmlformats.org/officeDocument/2006/relationships" xmlns:p="http://schemas.openxmlformats.org/presentationml/2006/main">
-  <p:cSld>
-    <p:spTree>
-      <p:nvGrpSpPr>
-        <p:cNvPr id="1" name=""/>
-        <p:cNvGrpSpPr/>
-        <p:nvPr/>
-      </p:nvGrpSpPr>
-      <p:grpSpPr>
-        <a:xfrm>
-          <a:off x="0" y="0"/>
-          <a:ext cx="0" cy="0"/>
-          <a:chOff x="0" y="0"/>
-          <a:chExt cx="0" cy="0"/>
-        </a:xfrm>
-      </p:grpSpPr>
-      <p:sp>
-        <p:nvSpPr>
-          <p:cNvPr id="2" name="Title 1"/>
-          <p:cNvSpPr>
-            <a:spLocks noGrp="1"/>
-          </p:cNvSpPr>
-          <p:nvPr>
-            <p:ph type="title"/>
-          </p:nvPr>
-        </p:nvSpPr>
-        <p:spPr/>
-        <p:txBody>
-          <a:bodyPr/>
-          <a:lstStyle/>
-          <a:p>
-            <a:r>
-              <a:rPr lang="en-US" dirty="0" smtClean="0"/>
-              <a:t>What to do?	</a:t>
-            </a:r>
-            <a:endParaRPr lang="en-US" dirty="0"/>
-          </a:p>
-        </p:txBody>
-      </p:sp>
-      <p:sp>
-        <p:nvSpPr>
-          <p:cNvPr id="3" name="Content Placeholder 2"/>
-          <p:cNvSpPr>
-            <a:spLocks noGrp="1"/>
-          </p:cNvSpPr>
-          <p:nvPr>
-            <p:ph idx="1"/>
-          </p:nvPr>
-        </p:nvSpPr>
-        <p:spPr/>
-        <p:txBody>
-          <a:bodyPr/>
-          <a:lstStyle/>
-          <a:p>
-            <a:r>
-              <a:rPr lang="en-US" dirty="0" smtClean="0"/>
-              <a:t>Don’t write large programs</a:t>
-            </a:r>
-          </a:p>
-          <a:p>
-            <a:r>
-              <a:rPr lang="en-US" dirty="0" smtClean="0"/>
-              <a:t>Write small programs with well defined interactions</a:t>
-            </a:r>
-            <a:endParaRPr lang="en-US" dirty="0"/>
-          </a:p>
-        </p:txBody>
-      </p:sp>
-    </p:spTree>
-    <p:extLst>
-      <p:ext uri="{BB962C8B-B14F-4D97-AF65-F5344CB8AC3E}">
-        <p14:creationId xmlns:p14="http://schemas.microsoft.com/office/powerpoint/2010/main" val="2563769726"/>
-      </p:ext>
-    </p:extLst>
-  </p:cSld>
-  <p:clrMapOvr>
-    <a:masterClrMapping/>
-  </p:clrMapOvr>
-  <p:timing>
-    <p:tnLst>
-      <p:par>
-        <p:cTn id="1" dur="indefinite" restart="never" nodeType="tmRoot">
-          <p:childTnLst>
-            <p:seq concurrent="1" nextAc="seek">
-              <p:cTn id="2" dur="indefinite" nodeType="mainSeq">
-                <p:childTnLst>
-                  <p:par>
-                    <p:cTn id="3" fill="hold">
-                      <p:stCondLst>
-                        <p:cond delay="indefinite"/>
-                      </p:stCondLst>
-                      <p:childTnLst>
-                        <p:par>
-                          <p:cTn id="4" fill="hold">
-                            <p:stCondLst>
-                              <p:cond delay="0"/>
-                            </p:stCondLst>
-                            <p:childTnLst>
-                              <p:par>
-                                <p:cTn id="5" presetID="10" presetClass="entr" presetSubtype="0" fill="hold" grpId="0" nodeType="clickEffect">
-                                  <p:stCondLst>
-                                    <p:cond delay="0"/>
-                                  </p:stCondLst>
-                                  <p:childTnLst>
-                                    <p:set>
-                                      <p:cBhvr>
-                                        <p:cTn id="6" dur="1" fill="hold">
-                                          <p:stCondLst>
-                                            <p:cond delay="0"/>
-                                          </p:stCondLst>
-                                        </p:cTn>
-                                        <p:tgtEl>
-                                          <p:spTgt spid="3">
-                                            <p:txEl>
-                                              <p:pRg st="0" end="0"/>
-                                            </p:txEl>
-                                          </p:spTgt>
-                                        </p:tgtEl>
-                                        <p:attrNameLst>
-                                          <p:attrName>style.visibility</p:attrName>
-                                        </p:attrNameLst>
-                                      </p:cBhvr>
-                                      <p:to>
-                                        <p:strVal val="visible"/>
-                                      </p:to>
-                                    </p:set>
-                                    <p:animEffect transition="in" filter="fade">
-                                      <p:cBhvr>
-                                        <p:cTn id="7" dur="500"/>
-                                        <p:tgtEl>
-                                          <p:spTgt spid="3">
-                                            <p:txEl>
-                                              <p:pRg st="0" end="0"/>
-                                            </p:txEl>
-                                          </p:spTgt>
-                                        </p:tgtEl>
-                                      </p:cBhvr>
-                                    </p:animEffect>
-                                  </p:childTnLst>
-                                </p:cTn>
-                              </p:par>
-                            </p:childTnLst>
-                          </p:cTn>
-                        </p:par>
-                      </p:childTnLst>
-                    </p:cTn>
-                  </p:par>
-                  <p:par>
-                    <p:cTn id="8" fill="hold">
-                      <p:stCondLst>
-                        <p:cond delay="indefinite"/>
-                      </p:stCondLst>
-                      <p:childTnLst>
-                        <p:par>
-                          <p:cTn id="9" fill="hold">
-                            <p:stCondLst>
-                              <p:cond delay="0"/>
-                            </p:stCondLst>
-                            <p:childTnLst>
-                              <p:par>
-                                <p:cTn id="10" presetID="10" presetClass="entr" presetSubtype="0" fill="hold" grpId="0" nodeType="clickEffect">
-                                  <p:stCondLst>
-                                    <p:cond delay="0"/>
-                                  </p:stCondLst>
-                                  <p:childTnLst>
-                                    <p:set>
-                                      <p:cBhvr>
-                                        <p:cTn id="11" dur="1" fill="hold">
-                                          <p:stCondLst>
-                                            <p:cond delay="0"/>
-                                          </p:stCondLst>
-                                        </p:cTn>
-                                        <p:tgtEl>
-                                          <p:spTgt spid="3">
-                                            <p:txEl>
-                                              <p:pRg st="1" end="1"/>
-                                            </p:txEl>
-                                          </p:spTgt>
-                                        </p:tgtEl>
-                                        <p:attrNameLst>
-                                          <p:attrName>style.visibility</p:attrName>
-                                        </p:attrNameLst>
-                                      </p:cBhvr>
-                                      <p:to>
-                                        <p:strVal val="visible"/>
-                                      </p:to>
-                                    </p:set>
-                                    <p:animEffect transition="in" filter="fade">
-                                      <p:cBhvr>
-                                        <p:cTn id="12" dur="500"/>
-                                        <p:tgtEl>
-                                          <p:spTgt spid="3">
-                                            <p:txEl>
-                                              <p:pRg st="1" end="1"/>
-                                            </p:txEl>
-                                          </p:spTgt>
-                                        </p:tgtEl>
-                                      </p:cBhvr>
-                                    </p:animEffect>
-                                  </p:childTnLst>
-                                </p:cTn>
-                              </p:par>
-                            </p:childTnLst>
-                          </p:cTn>
-                        </p:par>
-                      </p:childTnLst>
-                    </p:cTn>
-                  </p:par>
-                </p:childTnLst>
-              </p:cTn>
-              <p:prevCondLst>
-                <p:cond evt="onPrev" delay="0">
-                  <p:tgtEl>
-                    <p:sldTgt/>
-                  </p:tgtEl>
-                </p:cond>
-              </p:prevCondLst>
-              <p:nextCondLst>
-                <p:cond evt="onNext" delay="0">
-                  <p:tgtEl>
-                    <p:sldTgt/>
-                  </p:tgtEl>
-                </p:cond>
-              </p:nextCondLst>
-            </p:seq>
-          </p:childTnLst>
-        </p:cTn>
-      </p:par>
-    </p:tnLst>
-    <p:bldLst>
-      <p:bldP spid="3" grpId="0" build="p"/>
-    </p:bldLst>
-  </p:timing>
-</p:sld>
-</file>
-
-<file path=ppt/slides/slide17.xml><?xml version="1.0" encoding="utf-8"?>
-<p:sld xmlns:a="http://schemas.openxmlformats.org/drawingml/2006/main" xmlns:r="http://schemas.openxmlformats.org/officeDocument/2006/relationships" xmlns:p="http://schemas.openxmlformats.org/presentationml/2006/main">
-  <p:cSld>
-    <p:spTree>
-      <p:nvGrpSpPr>
-        <p:cNvPr id="1" name=""/>
-        <p:cNvGrpSpPr/>
-        <p:nvPr/>
-      </p:nvGrpSpPr>
-      <p:grpSpPr>
-        <a:xfrm>
-          <a:off x="0" y="0"/>
-          <a:ext cx="0" cy="0"/>
-          <a:chOff x="0" y="0"/>
-          <a:chExt cx="0" cy="0"/>
-        </a:xfrm>
-      </p:grpSpPr>
-      <p:sp>
-        <p:nvSpPr>
-          <p:cNvPr id="2" name="Title 1"/>
-          <p:cNvSpPr>
-            <a:spLocks noGrp="1"/>
-          </p:cNvSpPr>
-          <p:nvPr>
-            <p:ph type="title"/>
-          </p:nvPr>
-        </p:nvSpPr>
-        <p:spPr/>
-        <p:txBody>
-          <a:bodyPr/>
-          <a:lstStyle/>
-          <a:p>
-            <a:r>
-              <a:rPr lang="en-US" dirty="0" err="1" smtClean="0"/>
-              <a:t>Namespacing</a:t>
-            </a:r>
-            <a:r>
-              <a:rPr lang="en-US" dirty="0" smtClean="0"/>
-              <a:t> </a:t>
-            </a:r>
-            <a:r>
-              <a:rPr lang="en-US" dirty="0" err="1" smtClean="0"/>
-              <a:t>javascript</a:t>
-            </a:r>
-            <a:endParaRPr lang="en-US" dirty="0"/>
-          </a:p>
-        </p:txBody>
-      </p:sp>
-      <p:sp>
-        <p:nvSpPr>
-          <p:cNvPr id="3" name="Content Placeholder 2"/>
-          <p:cNvSpPr>
-            <a:spLocks noGrp="1"/>
-          </p:cNvSpPr>
-          <p:nvPr>
-            <p:ph idx="1"/>
-          </p:nvPr>
-        </p:nvSpPr>
-        <p:spPr/>
-        <p:txBody>
-          <a:bodyPr/>
-          <a:lstStyle/>
-          <a:p>
-            <a:r>
-              <a:rPr lang="en-US" dirty="0" smtClean="0"/>
-              <a:t>Demo</a:t>
-            </a:r>
-            <a:endParaRPr lang="en-US" dirty="0"/>
-          </a:p>
-        </p:txBody>
-      </p:sp>
-    </p:spTree>
-    <p:extLst>
-      <p:ext uri="{BB962C8B-B14F-4D97-AF65-F5344CB8AC3E}">
-        <p14:creationId xmlns:p14="http://schemas.microsoft.com/office/powerpoint/2010/main" val="136048517"/>
-      </p:ext>
-    </p:extLst>
-  </p:cSld>
-  <p:clrMapOvr>
-    <a:masterClrMapping/>
-  </p:clrMapOvr>
-  <p:timing>
-    <p:tnLst>
-      <p:par>
-        <p:cTn id="1" dur="indefinite" restart="never" nodeType="tmRoot"/>
-      </p:par>
-    </p:tnLst>
-  </p:timing>
-</p:sld>
-</file>
-
-<file path=ppt/slides/slide18.xml><?xml version="1.0" encoding="utf-8"?>
-<p:sld xmlns:a="http://schemas.openxmlformats.org/drawingml/2006/main" xmlns:r="http://schemas.openxmlformats.org/officeDocument/2006/relationships" xmlns:p="http://schemas.openxmlformats.org/presentationml/2006/main">
-  <p:cSld>
-    <p:spTree>
-      <p:nvGrpSpPr>
-        <p:cNvPr id="1" name=""/>
-        <p:cNvGrpSpPr/>
-        <p:nvPr/>
-      </p:nvGrpSpPr>
-      <p:grpSpPr>
-        <a:xfrm>
-          <a:off x="0" y="0"/>
-          <a:ext cx="0" cy="0"/>
-          <a:chOff x="0" y="0"/>
-          <a:chExt cx="0" cy="0"/>
-        </a:xfrm>
-      </p:grpSpPr>
-      <p:sp>
-        <p:nvSpPr>
-          <p:cNvPr id="2" name="Title 1"/>
-          <p:cNvSpPr>
-            <a:spLocks noGrp="1"/>
-          </p:cNvSpPr>
-          <p:nvPr>
-            <p:ph type="title"/>
-          </p:nvPr>
-        </p:nvSpPr>
-        <p:spPr/>
-        <p:txBody>
-          <a:bodyPr/>
-          <a:lstStyle/>
-          <a:p>
-            <a:r>
-              <a:rPr lang="en-US" dirty="0" smtClean="0"/>
-              <a:t>Prototype based </a:t>
-            </a:r>
-            <a:r>
-              <a:rPr lang="en-US" dirty="0" err="1" smtClean="0"/>
-              <a:t>inheritence</a:t>
-            </a:r>
-            <a:endParaRPr lang="en-US" dirty="0"/>
-          </a:p>
-        </p:txBody>
-      </p:sp>
-      <p:sp>
-        <p:nvSpPr>
-          <p:cNvPr id="3" name="Content Placeholder 2"/>
-          <p:cNvSpPr>
-            <a:spLocks noGrp="1"/>
-          </p:cNvSpPr>
-          <p:nvPr>
-            <p:ph idx="1"/>
-          </p:nvPr>
-        </p:nvSpPr>
-        <p:spPr/>
-        <p:txBody>
-          <a:bodyPr/>
-          <a:lstStyle/>
-          <a:p>
-            <a:r>
-              <a:rPr lang="en-US" dirty="0"/>
-              <a:t>D</a:t>
-            </a:r>
-            <a:r>
-              <a:rPr lang="en-US" dirty="0" smtClean="0"/>
-              <a:t>emo</a:t>
-            </a:r>
-            <a:endParaRPr lang="en-US" dirty="0"/>
-          </a:p>
-        </p:txBody>
-      </p:sp>
-    </p:spTree>
-    <p:extLst>
-      <p:ext uri="{BB962C8B-B14F-4D97-AF65-F5344CB8AC3E}">
-        <p14:creationId xmlns:p14="http://schemas.microsoft.com/office/powerpoint/2010/main" val="2729744749"/>
-      </p:ext>
-    </p:extLst>
-  </p:cSld>
-  <p:clrMapOvr>
-    <a:masterClrMapping/>
-  </p:clrMapOvr>
-  <p:timing>
-    <p:tnLst>
-      <p:par>
-        <p:cTn id="1" dur="indefinite" restart="never" nodeType="tmRoot"/>
-      </p:par>
-    </p:tnLst>
-  </p:timing>
-</p:sld>
-</file>
-
-<file path=ppt/slides/slide19.xml><?xml version="1.0" encoding="utf-8"?>
-<p:sld xmlns:a="http://schemas.openxmlformats.org/drawingml/2006/main" xmlns:r="http://schemas.openxmlformats.org/officeDocument/2006/relationships" xmlns:p="http://schemas.openxmlformats.org/presentationml/2006/main">
-  <p:cSld>
-    <p:spTree>
-      <p:nvGrpSpPr>
-        <p:cNvPr id="1" name=""/>
-        <p:cNvGrpSpPr/>
-        <p:nvPr/>
-      </p:nvGrpSpPr>
-      <p:grpSpPr>
-        <a:xfrm>
-          <a:off x="0" y="0"/>
-          <a:ext cx="0" cy="0"/>
-          <a:chOff x="0" y="0"/>
-          <a:chExt cx="0" cy="0"/>
-        </a:xfrm>
-      </p:grpSpPr>
-      <p:sp>
-        <p:nvSpPr>
-          <p:cNvPr id="2" name="Title 1"/>
-          <p:cNvSpPr>
-            <a:spLocks noGrp="1"/>
-          </p:cNvSpPr>
-          <p:nvPr>
-            <p:ph type="title"/>
-          </p:nvPr>
-        </p:nvSpPr>
-        <p:spPr/>
-        <p:txBody>
-          <a:bodyPr/>
-          <a:lstStyle/>
-          <a:p>
-            <a:r>
-              <a:rPr lang="en-US" dirty="0" smtClean="0"/>
-              <a:t>Testing </a:t>
-            </a:r>
-            <a:r>
-              <a:rPr lang="en-US" dirty="0" err="1" smtClean="0"/>
-              <a:t>javascript</a:t>
-            </a:r>
-            <a:endParaRPr lang="en-US" dirty="0"/>
-          </a:p>
-        </p:txBody>
-      </p:sp>
-      <p:sp>
-        <p:nvSpPr>
-          <p:cNvPr id="3" name="Content Placeholder 2"/>
-          <p:cNvSpPr>
-            <a:spLocks noGrp="1"/>
-          </p:cNvSpPr>
-          <p:nvPr>
-            <p:ph idx="1"/>
-          </p:nvPr>
-        </p:nvSpPr>
-        <p:spPr/>
-        <p:txBody>
-          <a:bodyPr/>
-          <a:lstStyle/>
-          <a:p>
-            <a:r>
-              <a:rPr lang="en-US" dirty="0" smtClean="0"/>
-              <a:t>Demo</a:t>
-            </a:r>
-            <a:endParaRPr lang="en-US" dirty="0"/>
-          </a:p>
-        </p:txBody>
-      </p:sp>
-    </p:spTree>
-    <p:extLst>
-      <p:ext uri="{BB962C8B-B14F-4D97-AF65-F5344CB8AC3E}">
-        <p14:creationId xmlns:p14="http://schemas.microsoft.com/office/powerpoint/2010/main" val="3110611344"/>
-      </p:ext>
-    </p:extLst>
-  </p:cSld>
-  <p:clrMapOvr>
-    <a:masterClrMapping/>
-  </p:clrMapOvr>
-  <p:timing>
-    <p:tnLst>
-      <p:par>
-        <p:cTn id="1" dur="indefinite" restart="never" nodeType="tmRoot"/>
-      </p:par>
-    </p:tnLst>
-  </p:timing>
-</p:sld>
-</file>
-
 <file path=ppt/slides/slide2.xml><?xml version="1.0" encoding="utf-8"?>
 <p:sld xmlns:a="http://schemas.openxmlformats.org/drawingml/2006/main" xmlns:r="http://schemas.openxmlformats.org/officeDocument/2006/relationships" xmlns:p="http://schemas.openxmlformats.org/presentationml/2006/main">
   <p:cSld>
@@ -16590,6 +16491,895 @@
     <p:bldLst>
       <p:bldP spid="3" grpId="0" build="p"/>
     </p:bldLst>
+  </p:timing>
+</p:sld>
+</file>
+
+<file path=ppt/slides/slide20.xml><?xml version="1.0" encoding="utf-8"?>
+<p:sld xmlns:a="http://schemas.openxmlformats.org/drawingml/2006/main" xmlns:r="http://schemas.openxmlformats.org/officeDocument/2006/relationships" xmlns:p="http://schemas.openxmlformats.org/presentationml/2006/main">
+  <p:cSld>
+    <p:spTree>
+      <p:nvGrpSpPr>
+        <p:cNvPr id="1" name=""/>
+        <p:cNvGrpSpPr/>
+        <p:nvPr/>
+      </p:nvGrpSpPr>
+      <p:grpSpPr>
+        <a:xfrm>
+          <a:off x="0" y="0"/>
+          <a:ext cx="0" cy="0"/>
+          <a:chOff x="0" y="0"/>
+          <a:chExt cx="0" cy="0"/>
+        </a:xfrm>
+      </p:grpSpPr>
+      <p:sp>
+        <p:nvSpPr>
+          <p:cNvPr id="2" name="Title 1"/>
+          <p:cNvSpPr>
+            <a:spLocks noGrp="1"/>
+          </p:cNvSpPr>
+          <p:nvPr>
+            <p:ph type="title"/>
+          </p:nvPr>
+        </p:nvSpPr>
+        <p:spPr/>
+        <p:txBody>
+          <a:bodyPr/>
+          <a:lstStyle/>
+          <a:p>
+            <a:r>
+              <a:rPr lang="en-US" dirty="0" smtClean="0"/>
+              <a:t>What to do?	</a:t>
+            </a:r>
+            <a:endParaRPr lang="en-US" dirty="0"/>
+          </a:p>
+        </p:txBody>
+      </p:sp>
+      <p:sp>
+        <p:nvSpPr>
+          <p:cNvPr id="3" name="Content Placeholder 2"/>
+          <p:cNvSpPr>
+            <a:spLocks noGrp="1"/>
+          </p:cNvSpPr>
+          <p:nvPr>
+            <p:ph idx="1"/>
+          </p:nvPr>
+        </p:nvSpPr>
+        <p:spPr/>
+        <p:txBody>
+          <a:bodyPr/>
+          <a:lstStyle/>
+          <a:p>
+            <a:r>
+              <a:rPr lang="en-US" dirty="0" smtClean="0"/>
+              <a:t>Don’t write large programs</a:t>
+            </a:r>
+          </a:p>
+          <a:p>
+            <a:r>
+              <a:rPr lang="en-US" dirty="0" smtClean="0"/>
+              <a:t>Write small programs with well defined </a:t>
+            </a:r>
+            <a:r>
+              <a:rPr lang="en-US" dirty="0" smtClean="0"/>
+              <a:t>interactions</a:t>
+            </a:r>
+          </a:p>
+          <a:p>
+            <a:endParaRPr lang="en-US" dirty="0"/>
+          </a:p>
+        </p:txBody>
+      </p:sp>
+    </p:spTree>
+    <p:extLst>
+      <p:ext uri="{BB962C8B-B14F-4D97-AF65-F5344CB8AC3E}">
+        <p14:creationId xmlns:p14="http://schemas.microsoft.com/office/powerpoint/2010/main" val="2563769726"/>
+      </p:ext>
+    </p:extLst>
+  </p:cSld>
+  <p:clrMapOvr>
+    <a:masterClrMapping/>
+  </p:clrMapOvr>
+  <p:timing>
+    <p:tnLst>
+      <p:par>
+        <p:cTn id="1" dur="indefinite" restart="never" nodeType="tmRoot">
+          <p:childTnLst>
+            <p:seq concurrent="1" nextAc="seek">
+              <p:cTn id="2" dur="indefinite" nodeType="mainSeq">
+                <p:childTnLst>
+                  <p:par>
+                    <p:cTn id="3" fill="hold">
+                      <p:stCondLst>
+                        <p:cond delay="indefinite"/>
+                      </p:stCondLst>
+                      <p:childTnLst>
+                        <p:par>
+                          <p:cTn id="4" fill="hold">
+                            <p:stCondLst>
+                              <p:cond delay="0"/>
+                            </p:stCondLst>
+                            <p:childTnLst>
+                              <p:par>
+                                <p:cTn id="5" presetID="10" presetClass="entr" presetSubtype="0" fill="hold" grpId="0" nodeType="clickEffect">
+                                  <p:stCondLst>
+                                    <p:cond delay="0"/>
+                                  </p:stCondLst>
+                                  <p:childTnLst>
+                                    <p:set>
+                                      <p:cBhvr>
+                                        <p:cTn id="6" dur="1" fill="hold">
+                                          <p:stCondLst>
+                                            <p:cond delay="0"/>
+                                          </p:stCondLst>
+                                        </p:cTn>
+                                        <p:tgtEl>
+                                          <p:spTgt spid="3">
+                                            <p:txEl>
+                                              <p:pRg st="0" end="0"/>
+                                            </p:txEl>
+                                          </p:spTgt>
+                                        </p:tgtEl>
+                                        <p:attrNameLst>
+                                          <p:attrName>style.visibility</p:attrName>
+                                        </p:attrNameLst>
+                                      </p:cBhvr>
+                                      <p:to>
+                                        <p:strVal val="visible"/>
+                                      </p:to>
+                                    </p:set>
+                                    <p:animEffect transition="in" filter="fade">
+                                      <p:cBhvr>
+                                        <p:cTn id="7" dur="500"/>
+                                        <p:tgtEl>
+                                          <p:spTgt spid="3">
+                                            <p:txEl>
+                                              <p:pRg st="0" end="0"/>
+                                            </p:txEl>
+                                          </p:spTgt>
+                                        </p:tgtEl>
+                                      </p:cBhvr>
+                                    </p:animEffect>
+                                  </p:childTnLst>
+                                </p:cTn>
+                              </p:par>
+                            </p:childTnLst>
+                          </p:cTn>
+                        </p:par>
+                      </p:childTnLst>
+                    </p:cTn>
+                  </p:par>
+                  <p:par>
+                    <p:cTn id="8" fill="hold">
+                      <p:stCondLst>
+                        <p:cond delay="indefinite"/>
+                      </p:stCondLst>
+                      <p:childTnLst>
+                        <p:par>
+                          <p:cTn id="9" fill="hold">
+                            <p:stCondLst>
+                              <p:cond delay="0"/>
+                            </p:stCondLst>
+                            <p:childTnLst>
+                              <p:par>
+                                <p:cTn id="10" presetID="10" presetClass="entr" presetSubtype="0" fill="hold" grpId="0" nodeType="clickEffect">
+                                  <p:stCondLst>
+                                    <p:cond delay="0"/>
+                                  </p:stCondLst>
+                                  <p:childTnLst>
+                                    <p:set>
+                                      <p:cBhvr>
+                                        <p:cTn id="11" dur="1" fill="hold">
+                                          <p:stCondLst>
+                                            <p:cond delay="0"/>
+                                          </p:stCondLst>
+                                        </p:cTn>
+                                        <p:tgtEl>
+                                          <p:spTgt spid="3">
+                                            <p:txEl>
+                                              <p:pRg st="1" end="1"/>
+                                            </p:txEl>
+                                          </p:spTgt>
+                                        </p:tgtEl>
+                                        <p:attrNameLst>
+                                          <p:attrName>style.visibility</p:attrName>
+                                        </p:attrNameLst>
+                                      </p:cBhvr>
+                                      <p:to>
+                                        <p:strVal val="visible"/>
+                                      </p:to>
+                                    </p:set>
+                                    <p:animEffect transition="in" filter="fade">
+                                      <p:cBhvr>
+                                        <p:cTn id="12" dur="500"/>
+                                        <p:tgtEl>
+                                          <p:spTgt spid="3">
+                                            <p:txEl>
+                                              <p:pRg st="1" end="1"/>
+                                            </p:txEl>
+                                          </p:spTgt>
+                                        </p:tgtEl>
+                                      </p:cBhvr>
+                                    </p:animEffect>
+                                  </p:childTnLst>
+                                </p:cTn>
+                              </p:par>
+                            </p:childTnLst>
+                          </p:cTn>
+                        </p:par>
+                      </p:childTnLst>
+                    </p:cTn>
+                  </p:par>
+                </p:childTnLst>
+              </p:cTn>
+              <p:prevCondLst>
+                <p:cond evt="onPrev" delay="0">
+                  <p:tgtEl>
+                    <p:sldTgt/>
+                  </p:tgtEl>
+                </p:cond>
+              </p:prevCondLst>
+              <p:nextCondLst>
+                <p:cond evt="onNext" delay="0">
+                  <p:tgtEl>
+                    <p:sldTgt/>
+                  </p:tgtEl>
+                </p:cond>
+              </p:nextCondLst>
+            </p:seq>
+          </p:childTnLst>
+        </p:cTn>
+      </p:par>
+    </p:tnLst>
+    <p:bldLst>
+      <p:bldP spid="3" grpId="0" build="p"/>
+    </p:bldLst>
+  </p:timing>
+</p:sld>
+</file>
+
+<file path=ppt/slides/slide21.xml><?xml version="1.0" encoding="utf-8"?>
+<p:sld xmlns:a="http://schemas.openxmlformats.org/drawingml/2006/main" xmlns:r="http://schemas.openxmlformats.org/officeDocument/2006/relationships" xmlns:p="http://schemas.openxmlformats.org/presentationml/2006/main">
+  <p:cSld>
+    <p:spTree>
+      <p:nvGrpSpPr>
+        <p:cNvPr id="1" name=""/>
+        <p:cNvGrpSpPr/>
+        <p:nvPr/>
+      </p:nvGrpSpPr>
+      <p:grpSpPr>
+        <a:xfrm>
+          <a:off x="0" y="0"/>
+          <a:ext cx="0" cy="0"/>
+          <a:chOff x="0" y="0"/>
+          <a:chExt cx="0" cy="0"/>
+        </a:xfrm>
+      </p:grpSpPr>
+      <p:sp>
+        <p:nvSpPr>
+          <p:cNvPr id="2" name="Title 1"/>
+          <p:cNvSpPr>
+            <a:spLocks noGrp="1"/>
+          </p:cNvSpPr>
+          <p:nvPr>
+            <p:ph type="title"/>
+          </p:nvPr>
+        </p:nvSpPr>
+        <p:spPr/>
+        <p:txBody>
+          <a:bodyPr/>
+          <a:lstStyle/>
+          <a:p>
+            <a:r>
+              <a:rPr lang="en-US" dirty="0" err="1" smtClean="0"/>
+              <a:t>Namespacing</a:t>
+            </a:r>
+            <a:r>
+              <a:rPr lang="en-US" dirty="0" smtClean="0"/>
+              <a:t> </a:t>
+            </a:r>
+            <a:r>
+              <a:rPr lang="en-US" dirty="0" err="1" smtClean="0"/>
+              <a:t>javascript</a:t>
+            </a:r>
+            <a:endParaRPr lang="en-US" dirty="0"/>
+          </a:p>
+        </p:txBody>
+      </p:sp>
+      <p:sp>
+        <p:nvSpPr>
+          <p:cNvPr id="3" name="Content Placeholder 2"/>
+          <p:cNvSpPr>
+            <a:spLocks noGrp="1"/>
+          </p:cNvSpPr>
+          <p:nvPr>
+            <p:ph idx="1"/>
+          </p:nvPr>
+        </p:nvSpPr>
+        <p:spPr/>
+        <p:txBody>
+          <a:bodyPr/>
+          <a:lstStyle/>
+          <a:p>
+            <a:r>
+              <a:rPr lang="en-US" dirty="0" smtClean="0"/>
+              <a:t>Demo</a:t>
+            </a:r>
+            <a:endParaRPr lang="en-US" dirty="0"/>
+          </a:p>
+        </p:txBody>
+      </p:sp>
+    </p:spTree>
+    <p:extLst>
+      <p:ext uri="{BB962C8B-B14F-4D97-AF65-F5344CB8AC3E}">
+        <p14:creationId xmlns:p14="http://schemas.microsoft.com/office/powerpoint/2010/main" val="136048517"/>
+      </p:ext>
+    </p:extLst>
+  </p:cSld>
+  <p:clrMapOvr>
+    <a:masterClrMapping/>
+  </p:clrMapOvr>
+  <p:timing>
+    <p:tnLst>
+      <p:par>
+        <p:cTn id="1" dur="indefinite" restart="never" nodeType="tmRoot"/>
+      </p:par>
+    </p:tnLst>
+  </p:timing>
+</p:sld>
+</file>
+
+<file path=ppt/slides/slide22.xml><?xml version="1.0" encoding="utf-8"?>
+<p:sld xmlns:a="http://schemas.openxmlformats.org/drawingml/2006/main" xmlns:r="http://schemas.openxmlformats.org/officeDocument/2006/relationships" xmlns:p="http://schemas.openxmlformats.org/presentationml/2006/main">
+  <p:cSld>
+    <p:spTree>
+      <p:nvGrpSpPr>
+        <p:cNvPr id="1" name=""/>
+        <p:cNvGrpSpPr/>
+        <p:nvPr/>
+      </p:nvGrpSpPr>
+      <p:grpSpPr>
+        <a:xfrm>
+          <a:off x="0" y="0"/>
+          <a:ext cx="0" cy="0"/>
+          <a:chOff x="0" y="0"/>
+          <a:chExt cx="0" cy="0"/>
+        </a:xfrm>
+      </p:grpSpPr>
+      <p:sp>
+        <p:nvSpPr>
+          <p:cNvPr id="2" name="Title 1"/>
+          <p:cNvSpPr>
+            <a:spLocks noGrp="1"/>
+          </p:cNvSpPr>
+          <p:nvPr>
+            <p:ph type="title"/>
+          </p:nvPr>
+        </p:nvSpPr>
+        <p:spPr/>
+        <p:txBody>
+          <a:bodyPr/>
+          <a:lstStyle/>
+          <a:p>
+            <a:r>
+              <a:rPr lang="en-US" dirty="0" smtClean="0"/>
+              <a:t>Prototype based </a:t>
+            </a:r>
+            <a:r>
+              <a:rPr lang="en-US" dirty="0" smtClean="0"/>
+              <a:t>inheritance</a:t>
+            </a:r>
+            <a:endParaRPr lang="en-US" dirty="0"/>
+          </a:p>
+        </p:txBody>
+      </p:sp>
+      <p:sp>
+        <p:nvSpPr>
+          <p:cNvPr id="3" name="Content Placeholder 2"/>
+          <p:cNvSpPr>
+            <a:spLocks noGrp="1"/>
+          </p:cNvSpPr>
+          <p:nvPr>
+            <p:ph idx="1"/>
+          </p:nvPr>
+        </p:nvSpPr>
+        <p:spPr/>
+        <p:txBody>
+          <a:bodyPr/>
+          <a:lstStyle/>
+          <a:p>
+            <a:r>
+              <a:rPr lang="en-US" dirty="0"/>
+              <a:t>D</a:t>
+            </a:r>
+            <a:r>
+              <a:rPr lang="en-US" dirty="0" smtClean="0"/>
+              <a:t>emo</a:t>
+            </a:r>
+            <a:endParaRPr lang="en-US" dirty="0"/>
+          </a:p>
+        </p:txBody>
+      </p:sp>
+    </p:spTree>
+    <p:extLst>
+      <p:ext uri="{BB962C8B-B14F-4D97-AF65-F5344CB8AC3E}">
+        <p14:creationId xmlns:p14="http://schemas.microsoft.com/office/powerpoint/2010/main" val="2729744749"/>
+      </p:ext>
+    </p:extLst>
+  </p:cSld>
+  <p:clrMapOvr>
+    <a:masterClrMapping/>
+  </p:clrMapOvr>
+  <p:timing>
+    <p:tnLst>
+      <p:par>
+        <p:cTn id="1" dur="indefinite" restart="never" nodeType="tmRoot"/>
+      </p:par>
+    </p:tnLst>
+  </p:timing>
+</p:sld>
+</file>
+
+<file path=ppt/slides/slide23.xml><?xml version="1.0" encoding="utf-8"?>
+<p:sld xmlns:a="http://schemas.openxmlformats.org/drawingml/2006/main" xmlns:r="http://schemas.openxmlformats.org/officeDocument/2006/relationships" xmlns:p="http://schemas.openxmlformats.org/presentationml/2006/main">
+  <p:cSld>
+    <p:spTree>
+      <p:nvGrpSpPr>
+        <p:cNvPr id="1" name=""/>
+        <p:cNvGrpSpPr/>
+        <p:nvPr/>
+      </p:nvGrpSpPr>
+      <p:grpSpPr>
+        <a:xfrm>
+          <a:off x="0" y="0"/>
+          <a:ext cx="0" cy="0"/>
+          <a:chOff x="0" y="0"/>
+          <a:chExt cx="0" cy="0"/>
+        </a:xfrm>
+      </p:grpSpPr>
+      <p:sp>
+        <p:nvSpPr>
+          <p:cNvPr id="2" name="Title 1"/>
+          <p:cNvSpPr>
+            <a:spLocks noGrp="1"/>
+          </p:cNvSpPr>
+          <p:nvPr>
+            <p:ph type="title"/>
+          </p:nvPr>
+        </p:nvSpPr>
+        <p:spPr/>
+        <p:txBody>
+          <a:bodyPr/>
+          <a:lstStyle/>
+          <a:p>
+            <a:r>
+              <a:rPr lang="en-US" dirty="0" smtClean="0"/>
+              <a:t>Use other tools</a:t>
+            </a:r>
+            <a:endParaRPr lang="en-US" dirty="0"/>
+          </a:p>
+        </p:txBody>
+      </p:sp>
+      <p:sp>
+        <p:nvSpPr>
+          <p:cNvPr id="3" name="Content Placeholder 2"/>
+          <p:cNvSpPr>
+            <a:spLocks noGrp="1"/>
+          </p:cNvSpPr>
+          <p:nvPr>
+            <p:ph idx="1"/>
+          </p:nvPr>
+        </p:nvSpPr>
+        <p:spPr/>
+        <p:txBody>
+          <a:bodyPr/>
+          <a:lstStyle/>
+          <a:p>
+            <a:r>
+              <a:rPr lang="en-US" dirty="0" err="1" smtClean="0"/>
+              <a:t>Coffeescript</a:t>
+            </a:r>
+            <a:r>
+              <a:rPr lang="en-US" dirty="0" smtClean="0"/>
+              <a:t> is a strong alternative to JavaScript</a:t>
+            </a:r>
+          </a:p>
+          <a:p>
+            <a:r>
+              <a:rPr lang="en-US" dirty="0" smtClean="0"/>
+              <a:t>There are many, many others </a:t>
+            </a:r>
+            <a:r>
+              <a:rPr lang="en-US" dirty="0">
+                <a:hlinkClick r:id="rId2"/>
+              </a:rPr>
+              <a:t>http://altjs.org/</a:t>
+            </a:r>
+            <a:endParaRPr lang="en-US" dirty="0"/>
+          </a:p>
+        </p:txBody>
+      </p:sp>
+      <p:grpSp>
+        <p:nvGrpSpPr>
+          <p:cNvPr id="6" name="Group 5"/>
+          <p:cNvGrpSpPr/>
+          <p:nvPr/>
+        </p:nvGrpSpPr>
+        <p:grpSpPr>
+          <a:xfrm>
+            <a:off x="609600" y="3321278"/>
+            <a:ext cx="7924800" cy="1261884"/>
+            <a:chOff x="609600" y="3321278"/>
+            <a:chExt cx="7924800" cy="1261884"/>
+          </a:xfrm>
+        </p:grpSpPr>
+        <p:sp>
+          <p:nvSpPr>
+            <p:cNvPr id="4" name="Rectangle 3"/>
+            <p:cNvSpPr/>
+            <p:nvPr/>
+          </p:nvSpPr>
+          <p:spPr>
+            <a:xfrm>
+              <a:off x="609600" y="3321278"/>
+              <a:ext cx="7924800" cy="923330"/>
+            </a:xfrm>
+            <a:prstGeom prst="rect">
+              <a:avLst/>
+            </a:prstGeom>
+          </p:spPr>
+          <p:txBody>
+            <a:bodyPr wrap="square">
+              <a:spAutoFit/>
+            </a:bodyPr>
+            <a:lstStyle/>
+            <a:p>
+              <a:r>
+                <a:rPr lang="en-US" b="1" i="1" dirty="0"/>
+                <a:t>JavaScript is an assembly language. The JavaScript + HTML generate is like a .NET assembly. The browser can execute it, but no human should really care what’s there. </a:t>
+              </a:r>
+              <a:r>
+                <a:rPr lang="en-US" b="1" i="1" dirty="0" smtClean="0"/>
+                <a:t>-</a:t>
+              </a:r>
+              <a:endParaRPr lang="en-US" dirty="0"/>
+            </a:p>
+          </p:txBody>
+        </p:sp>
+        <p:sp>
+          <p:nvSpPr>
+            <p:cNvPr id="5" name="Rectangle 4"/>
+            <p:cNvSpPr/>
+            <p:nvPr/>
+          </p:nvSpPr>
+          <p:spPr>
+            <a:xfrm>
+              <a:off x="7010400" y="4244608"/>
+              <a:ext cx="1178528" cy="338554"/>
+            </a:xfrm>
+            <a:prstGeom prst="rect">
+              <a:avLst/>
+            </a:prstGeom>
+          </p:spPr>
+          <p:txBody>
+            <a:bodyPr wrap="none">
+              <a:spAutoFit/>
+            </a:bodyPr>
+            <a:lstStyle/>
+            <a:p>
+              <a:r>
+                <a:rPr lang="en-US" sz="1600" b="1" i="1" dirty="0"/>
+                <a:t>Erik Meijer</a:t>
+              </a:r>
+              <a:endParaRPr lang="en-US" sz="1600" dirty="0"/>
+            </a:p>
+          </p:txBody>
+        </p:sp>
+      </p:grpSp>
+    </p:spTree>
+    <p:extLst>
+      <p:ext uri="{BB962C8B-B14F-4D97-AF65-F5344CB8AC3E}">
+        <p14:creationId xmlns:p14="http://schemas.microsoft.com/office/powerpoint/2010/main" val="1818192249"/>
+      </p:ext>
+    </p:extLst>
+  </p:cSld>
+  <p:clrMapOvr>
+    <a:masterClrMapping/>
+  </p:clrMapOvr>
+  <p:timing>
+    <p:tnLst>
+      <p:par>
+        <p:cTn id="1" dur="indefinite" restart="never" nodeType="tmRoot">
+          <p:childTnLst>
+            <p:seq concurrent="1" nextAc="seek">
+              <p:cTn id="2" dur="indefinite" nodeType="mainSeq">
+                <p:childTnLst>
+                  <p:par>
+                    <p:cTn id="3" fill="hold">
+                      <p:stCondLst>
+                        <p:cond delay="indefinite"/>
+                      </p:stCondLst>
+                      <p:childTnLst>
+                        <p:par>
+                          <p:cTn id="4" fill="hold">
+                            <p:stCondLst>
+                              <p:cond delay="0"/>
+                            </p:stCondLst>
+                            <p:childTnLst>
+                              <p:par>
+                                <p:cTn id="5" presetID="10" presetClass="entr" presetSubtype="0" fill="hold" grpId="0" nodeType="clickEffect">
+                                  <p:stCondLst>
+                                    <p:cond delay="0"/>
+                                  </p:stCondLst>
+                                  <p:childTnLst>
+                                    <p:set>
+                                      <p:cBhvr>
+                                        <p:cTn id="6" dur="1" fill="hold">
+                                          <p:stCondLst>
+                                            <p:cond delay="0"/>
+                                          </p:stCondLst>
+                                        </p:cTn>
+                                        <p:tgtEl>
+                                          <p:spTgt spid="3">
+                                            <p:txEl>
+                                              <p:pRg st="0" end="0"/>
+                                            </p:txEl>
+                                          </p:spTgt>
+                                        </p:tgtEl>
+                                        <p:attrNameLst>
+                                          <p:attrName>style.visibility</p:attrName>
+                                        </p:attrNameLst>
+                                      </p:cBhvr>
+                                      <p:to>
+                                        <p:strVal val="visible"/>
+                                      </p:to>
+                                    </p:set>
+                                    <p:animEffect transition="in" filter="fade">
+                                      <p:cBhvr>
+                                        <p:cTn id="7" dur="500"/>
+                                        <p:tgtEl>
+                                          <p:spTgt spid="3">
+                                            <p:txEl>
+                                              <p:pRg st="0" end="0"/>
+                                            </p:txEl>
+                                          </p:spTgt>
+                                        </p:tgtEl>
+                                      </p:cBhvr>
+                                    </p:animEffect>
+                                  </p:childTnLst>
+                                </p:cTn>
+                              </p:par>
+                            </p:childTnLst>
+                          </p:cTn>
+                        </p:par>
+                      </p:childTnLst>
+                    </p:cTn>
+                  </p:par>
+                  <p:par>
+                    <p:cTn id="8" fill="hold">
+                      <p:stCondLst>
+                        <p:cond delay="indefinite"/>
+                      </p:stCondLst>
+                      <p:childTnLst>
+                        <p:par>
+                          <p:cTn id="9" fill="hold">
+                            <p:stCondLst>
+                              <p:cond delay="0"/>
+                            </p:stCondLst>
+                            <p:childTnLst>
+                              <p:par>
+                                <p:cTn id="10" presetID="10" presetClass="entr" presetSubtype="0" fill="hold" grpId="0" nodeType="clickEffect">
+                                  <p:stCondLst>
+                                    <p:cond delay="0"/>
+                                  </p:stCondLst>
+                                  <p:childTnLst>
+                                    <p:set>
+                                      <p:cBhvr>
+                                        <p:cTn id="11" dur="1" fill="hold">
+                                          <p:stCondLst>
+                                            <p:cond delay="0"/>
+                                          </p:stCondLst>
+                                        </p:cTn>
+                                        <p:tgtEl>
+                                          <p:spTgt spid="3">
+                                            <p:txEl>
+                                              <p:pRg st="1" end="1"/>
+                                            </p:txEl>
+                                          </p:spTgt>
+                                        </p:tgtEl>
+                                        <p:attrNameLst>
+                                          <p:attrName>style.visibility</p:attrName>
+                                        </p:attrNameLst>
+                                      </p:cBhvr>
+                                      <p:to>
+                                        <p:strVal val="visible"/>
+                                      </p:to>
+                                    </p:set>
+                                    <p:animEffect transition="in" filter="fade">
+                                      <p:cBhvr>
+                                        <p:cTn id="12" dur="500"/>
+                                        <p:tgtEl>
+                                          <p:spTgt spid="3">
+                                            <p:txEl>
+                                              <p:pRg st="1" end="1"/>
+                                            </p:txEl>
+                                          </p:spTgt>
+                                        </p:tgtEl>
+                                      </p:cBhvr>
+                                    </p:animEffect>
+                                  </p:childTnLst>
+                                </p:cTn>
+                              </p:par>
+                            </p:childTnLst>
+                          </p:cTn>
+                        </p:par>
+                      </p:childTnLst>
+                    </p:cTn>
+                  </p:par>
+                  <p:par>
+                    <p:cTn id="13" fill="hold">
+                      <p:stCondLst>
+                        <p:cond delay="indefinite"/>
+                      </p:stCondLst>
+                      <p:childTnLst>
+                        <p:par>
+                          <p:cTn id="14" fill="hold">
+                            <p:stCondLst>
+                              <p:cond delay="0"/>
+                            </p:stCondLst>
+                            <p:childTnLst>
+                              <p:par>
+                                <p:cTn id="15" presetID="10" presetClass="entr" presetSubtype="0" fill="hold" nodeType="clickEffect">
+                                  <p:stCondLst>
+                                    <p:cond delay="0"/>
+                                  </p:stCondLst>
+                                  <p:childTnLst>
+                                    <p:set>
+                                      <p:cBhvr>
+                                        <p:cTn id="16" dur="1" fill="hold">
+                                          <p:stCondLst>
+                                            <p:cond delay="0"/>
+                                          </p:stCondLst>
+                                        </p:cTn>
+                                        <p:tgtEl>
+                                          <p:spTgt spid="6"/>
+                                        </p:tgtEl>
+                                        <p:attrNameLst>
+                                          <p:attrName>style.visibility</p:attrName>
+                                        </p:attrNameLst>
+                                      </p:cBhvr>
+                                      <p:to>
+                                        <p:strVal val="visible"/>
+                                      </p:to>
+                                    </p:set>
+                                    <p:animEffect transition="in" filter="fade">
+                                      <p:cBhvr>
+                                        <p:cTn id="17" dur="500"/>
+                                        <p:tgtEl>
+                                          <p:spTgt spid="6"/>
+                                        </p:tgtEl>
+                                      </p:cBhvr>
+                                    </p:animEffect>
+                                  </p:childTnLst>
+                                </p:cTn>
+                              </p:par>
+                            </p:childTnLst>
+                          </p:cTn>
+                        </p:par>
+                      </p:childTnLst>
+                    </p:cTn>
+                  </p:par>
+                </p:childTnLst>
+              </p:cTn>
+              <p:prevCondLst>
+                <p:cond evt="onPrev" delay="0">
+                  <p:tgtEl>
+                    <p:sldTgt/>
+                  </p:tgtEl>
+                </p:cond>
+              </p:prevCondLst>
+              <p:nextCondLst>
+                <p:cond evt="onNext" delay="0">
+                  <p:tgtEl>
+                    <p:sldTgt/>
+                  </p:tgtEl>
+                </p:cond>
+              </p:nextCondLst>
+            </p:seq>
+          </p:childTnLst>
+        </p:cTn>
+      </p:par>
+    </p:tnLst>
+    <p:bldLst>
+      <p:bldP spid="3" grpId="0" build="p"/>
+    </p:bldLst>
+  </p:timing>
+</p:sld>
+</file>
+
+<file path=ppt/slides/slide24.xml><?xml version="1.0" encoding="utf-8"?>
+<p:sld xmlns:a="http://schemas.openxmlformats.org/drawingml/2006/main" xmlns:r="http://schemas.openxmlformats.org/officeDocument/2006/relationships" xmlns:p="http://schemas.openxmlformats.org/presentationml/2006/main">
+  <p:cSld>
+    <p:spTree>
+      <p:nvGrpSpPr>
+        <p:cNvPr id="1" name=""/>
+        <p:cNvGrpSpPr/>
+        <p:nvPr/>
+      </p:nvGrpSpPr>
+      <p:grpSpPr>
+        <a:xfrm>
+          <a:off x="0" y="0"/>
+          <a:ext cx="0" cy="0"/>
+          <a:chOff x="0" y="0"/>
+          <a:chExt cx="0" cy="0"/>
+        </a:xfrm>
+      </p:grpSpPr>
+      <p:sp>
+        <p:nvSpPr>
+          <p:cNvPr id="2" name="Title 1"/>
+          <p:cNvSpPr>
+            <a:spLocks noGrp="1"/>
+          </p:cNvSpPr>
+          <p:nvPr>
+            <p:ph type="title"/>
+          </p:nvPr>
+        </p:nvSpPr>
+        <p:spPr/>
+        <p:txBody>
+          <a:bodyPr/>
+          <a:lstStyle/>
+          <a:p>
+            <a:r>
+              <a:rPr lang="en-US" dirty="0" smtClean="0"/>
+              <a:t>Testing </a:t>
+            </a:r>
+            <a:r>
+              <a:rPr lang="en-US" dirty="0" err="1" smtClean="0"/>
+              <a:t>javascript</a:t>
+            </a:r>
+            <a:endParaRPr lang="en-US" dirty="0"/>
+          </a:p>
+        </p:txBody>
+      </p:sp>
+      <p:sp>
+        <p:nvSpPr>
+          <p:cNvPr id="3" name="Content Placeholder 2"/>
+          <p:cNvSpPr>
+            <a:spLocks noGrp="1"/>
+          </p:cNvSpPr>
+          <p:nvPr>
+            <p:ph idx="1"/>
+          </p:nvPr>
+        </p:nvSpPr>
+        <p:spPr/>
+        <p:txBody>
+          <a:bodyPr/>
+          <a:lstStyle/>
+          <a:p>
+            <a:r>
+              <a:rPr lang="en-US" dirty="0" smtClean="0"/>
+              <a:t>Demo</a:t>
+            </a:r>
+            <a:endParaRPr lang="en-US" dirty="0"/>
+          </a:p>
+        </p:txBody>
+      </p:sp>
+    </p:spTree>
+    <p:extLst>
+      <p:ext uri="{BB962C8B-B14F-4D97-AF65-F5344CB8AC3E}">
+        <p14:creationId xmlns:p14="http://schemas.microsoft.com/office/powerpoint/2010/main" val="3110611344"/>
+      </p:ext>
+    </p:extLst>
+  </p:cSld>
+  <p:clrMapOvr>
+    <a:masterClrMapping/>
+  </p:clrMapOvr>
+  <p:timing>
+    <p:tnLst>
+      <p:par>
+        <p:cTn id="1" dur="indefinite" restart="never" nodeType="tmRoot"/>
+      </p:par>
+    </p:tnLst>
   </p:timing>
 </p:sld>
 </file>

</xml_diff>